<commit_message>
update cv and other doc
</commit_message>
<xml_diff>
--- a/mitraIntegra/projecct/Member card SMI.pptx
+++ b/mitraIntegra/projecct/Member card SMI.pptx
@@ -14,7 +14,12 @@
     <p:sldId id="262" r:id="rId8"/>
     <p:sldId id="264" r:id="rId9"/>
     <p:sldId id="265" r:id="rId10"/>
-    <p:sldId id="266" r:id="rId11"/>
+    <p:sldId id="267" r:id="rId11"/>
+    <p:sldId id="269" r:id="rId12"/>
+    <p:sldId id="268" r:id="rId13"/>
+    <p:sldId id="270" r:id="rId14"/>
+    <p:sldId id="271" r:id="rId15"/>
+    <p:sldId id="266" r:id="rId16"/>
   </p:sldIdLst>
   <p:sldSz cx="12192000" cy="6858000"/>
   <p:notesSz cx="6858000" cy="9144000"/>
@@ -121,6 +126,120 @@
 </p:presentation>
 </file>
 
+<file path=ppt/commentAuthors.xml><?xml version="1.0" encoding="utf-8"?>
+<p:cmAuthorLst xmlns:a="http://schemas.openxmlformats.org/drawingml/2006/main" xmlns:r="http://schemas.openxmlformats.org/officeDocument/2006/relationships" xmlns:p="http://schemas.openxmlformats.org/presentationml/2006/main">
+  <p:cmAuthor id="1" name="Guna Dermawan" initials="GD" lastIdx="10" clrIdx="0">
+    <p:extLst>
+      <p:ext uri="{19B8F6BF-5375-455C-9EA6-DF929625EA0E}">
+        <p15:presenceInfo xmlns:p15="http://schemas.microsoft.com/office/powerpoint/2012/main" userId="77af1956743b521e" providerId="Windows Live"/>
+      </p:ext>
+    </p:extLst>
+  </p:cmAuthor>
+</p:cmAuthorLst>
+</file>
+
+<file path=ppt/comments/comment1.xml><?xml version="1.0" encoding="utf-8"?>
+<p:cmLst xmlns:a="http://schemas.openxmlformats.org/drawingml/2006/main" xmlns:r="http://schemas.openxmlformats.org/officeDocument/2006/relationships" xmlns:p="http://schemas.openxmlformats.org/presentationml/2006/main">
+  <p:cm authorId="1" dt="2022-07-14T19:18:26.579" idx="1">
+    <p:pos x="10" y="10"/>
+    <p:text>-kartu fisik</p:text>
+    <p:extLst>
+      <p:ext uri="{C676402C-5697-4E1C-873F-D02D1690AC5C}">
+        <p15:threadingInfo xmlns:p15="http://schemas.microsoft.com/office/powerpoint/2012/main" timeZoneBias="-420"/>
+      </p:ext>
+    </p:extLst>
+  </p:cm>
+  <p:cm authorId="1" dt="2022-07-14T19:18:59.815" idx="2">
+    <p:pos x="10" y="106"/>
+    <p:text>ada tombol pembayaran</p:text>
+    <p:extLst>
+      <p:ext uri="{C676402C-5697-4E1C-873F-D02D1690AC5C}">
+        <p15:threadingInfo xmlns:p15="http://schemas.microsoft.com/office/powerpoint/2012/main" timeZoneBias="-420">
+          <p15:parentCm authorId="1" idx="1"/>
+        </p15:threadingInfo>
+      </p:ext>
+    </p:extLst>
+  </p:cm>
+  <p:cm authorId="1" dt="2022-07-14T19:21:21.558" idx="3">
+    <p:pos x="10" y="202"/>
+    <p:text>berdasarkan jml nominal trtentu</p:text>
+    <p:extLst>
+      <p:ext uri="{C676402C-5697-4E1C-873F-D02D1690AC5C}">
+        <p15:threadingInfo xmlns:p15="http://schemas.microsoft.com/office/powerpoint/2012/main" timeZoneBias="-420">
+          <p15:parentCm authorId="1" idx="1"/>
+        </p15:threadingInfo>
+      </p:ext>
+    </p:extLst>
+  </p:cm>
+  <p:cm authorId="1" dt="2022-07-14T19:24:21.516" idx="4">
+    <p:pos x="10" y="298"/>
+    <p:text>nanyain stok barang, ada supliernya ato dri gudang aja</p:text>
+    <p:extLst>
+      <p:ext uri="{C676402C-5697-4E1C-873F-D02D1690AC5C}">
+        <p15:threadingInfo xmlns:p15="http://schemas.microsoft.com/office/powerpoint/2012/main" timeZoneBias="-420">
+          <p15:parentCm authorId="1" idx="1"/>
+        </p15:threadingInfo>
+      </p:ext>
+    </p:extLst>
+  </p:cm>
+  <p:cm authorId="1" dt="2022-07-14T19:28:00.070" idx="5">
+    <p:pos x="10" y="394"/>
+    <p:text>pembeli belanja ke tempat atau bsa online jga?</p:text>
+    <p:extLst>
+      <p:ext uri="{C676402C-5697-4E1C-873F-D02D1690AC5C}">
+        <p15:threadingInfo xmlns:p15="http://schemas.microsoft.com/office/powerpoint/2012/main" timeZoneBias="-420">
+          <p15:parentCm authorId="1" idx="1"/>
+        </p15:threadingInfo>
+      </p:ext>
+    </p:extLst>
+  </p:cm>
+  <p:cm authorId="1" dt="2022-07-14T19:32:33.024" idx="6">
+    <p:pos x="10" y="490"/>
+    <p:text>beresin B2B dlu, baru ke arah aplikasi online</p:text>
+    <p:extLst>
+      <p:ext uri="{C676402C-5697-4E1C-873F-D02D1690AC5C}">
+        <p15:threadingInfo xmlns:p15="http://schemas.microsoft.com/office/powerpoint/2012/main" timeZoneBias="-420">
+          <p15:parentCm authorId="1" idx="1"/>
+        </p15:threadingInfo>
+      </p:ext>
+    </p:extLst>
+  </p:cm>
+  <p:cm authorId="1" dt="2022-07-14T19:35:32.805" idx="7">
+    <p:pos x="10" y="586"/>
+    <p:text>menyediakan master buat kartu pelanggan</p:text>
+    <p:extLst>
+      <p:ext uri="{C676402C-5697-4E1C-873F-D02D1690AC5C}">
+        <p15:threadingInfo xmlns:p15="http://schemas.microsoft.com/office/powerpoint/2012/main" timeZoneBias="-420">
+          <p15:parentCm authorId="1" idx="1"/>
+        </p15:threadingInfo>
+      </p:ext>
+    </p:extLst>
+  </p:cm>
+  <p:cm authorId="1" dt="2022-07-14T19:36:54.175" idx="9">
+    <p:pos x="10" y="682"/>
+    <p:text>klo mau promo nnti dilakuin tiap barang</p:text>
+    <p:extLst>
+      <p:ext uri="{C676402C-5697-4E1C-873F-D02D1690AC5C}">
+        <p15:threadingInfo xmlns:p15="http://schemas.microsoft.com/office/powerpoint/2012/main" timeZoneBias="-420">
+          <p15:parentCm authorId="1" idx="1"/>
+        </p15:threadingInfo>
+      </p:ext>
+    </p:extLst>
+  </p:cm>
+  <p:cm authorId="1" dt="2022-07-14T19:38:49.412" idx="10">
+    <p:pos x="10" y="778"/>
+    <p:text>2 bulan</p:text>
+    <p:extLst>
+      <p:ext uri="{C676402C-5697-4E1C-873F-D02D1690AC5C}">
+        <p15:threadingInfo xmlns:p15="http://schemas.microsoft.com/office/powerpoint/2012/main" timeZoneBias="-420">
+          <p15:parentCm authorId="1" idx="1"/>
+        </p15:threadingInfo>
+      </p:ext>
+    </p:extLst>
+  </p:cm>
+</p:cmLst>
+</file>
+
 <file path=ppt/slideLayouts/slideLayout1.xml><?xml version="1.0" encoding="utf-8"?>
 <p:sldLayout xmlns:a="http://schemas.openxmlformats.org/drawingml/2006/main" xmlns:r="http://schemas.openxmlformats.org/officeDocument/2006/relationships" xmlns:p="http://schemas.openxmlformats.org/presentationml/2006/main" type="title" preserve="1">
   <p:cSld name="Title Slide">
@@ -270,7 +389,7 @@
           <a:p>
             <a:fld id="{101A8BB2-6174-47C5-8A50-12968FF74364}" type="datetimeFigureOut">
               <a:rPr lang="en-ID" smtClean="0"/>
-              <a:t>23/06/2022</a:t>
+              <a:t>15/07/2022</a:t>
             </a:fld>
             <a:endParaRPr lang="en-ID"/>
           </a:p>
@@ -470,7 +589,7 @@
           <a:p>
             <a:fld id="{101A8BB2-6174-47C5-8A50-12968FF74364}" type="datetimeFigureOut">
               <a:rPr lang="en-ID" smtClean="0"/>
-              <a:t>23/06/2022</a:t>
+              <a:t>15/07/2022</a:t>
             </a:fld>
             <a:endParaRPr lang="en-ID"/>
           </a:p>
@@ -680,7 +799,7 @@
           <a:p>
             <a:fld id="{101A8BB2-6174-47C5-8A50-12968FF74364}" type="datetimeFigureOut">
               <a:rPr lang="en-ID" smtClean="0"/>
-              <a:t>23/06/2022</a:t>
+              <a:t>15/07/2022</a:t>
             </a:fld>
             <a:endParaRPr lang="en-ID"/>
           </a:p>
@@ -880,7 +999,7 @@
           <a:p>
             <a:fld id="{101A8BB2-6174-47C5-8A50-12968FF74364}" type="datetimeFigureOut">
               <a:rPr lang="en-ID" smtClean="0"/>
-              <a:t>23/06/2022</a:t>
+              <a:t>15/07/2022</a:t>
             </a:fld>
             <a:endParaRPr lang="en-ID"/>
           </a:p>
@@ -1156,7 +1275,7 @@
           <a:p>
             <a:fld id="{101A8BB2-6174-47C5-8A50-12968FF74364}" type="datetimeFigureOut">
               <a:rPr lang="en-ID" smtClean="0"/>
-              <a:t>23/06/2022</a:t>
+              <a:t>15/07/2022</a:t>
             </a:fld>
             <a:endParaRPr lang="en-ID"/>
           </a:p>
@@ -1424,7 +1543,7 @@
           <a:p>
             <a:fld id="{101A8BB2-6174-47C5-8A50-12968FF74364}" type="datetimeFigureOut">
               <a:rPr lang="en-ID" smtClean="0"/>
-              <a:t>23/06/2022</a:t>
+              <a:t>15/07/2022</a:t>
             </a:fld>
             <a:endParaRPr lang="en-ID"/>
           </a:p>
@@ -1839,7 +1958,7 @@
           <a:p>
             <a:fld id="{101A8BB2-6174-47C5-8A50-12968FF74364}" type="datetimeFigureOut">
               <a:rPr lang="en-ID" smtClean="0"/>
-              <a:t>23/06/2022</a:t>
+              <a:t>15/07/2022</a:t>
             </a:fld>
             <a:endParaRPr lang="en-ID"/>
           </a:p>
@@ -1981,7 +2100,7 @@
           <a:p>
             <a:fld id="{101A8BB2-6174-47C5-8A50-12968FF74364}" type="datetimeFigureOut">
               <a:rPr lang="en-ID" smtClean="0"/>
-              <a:t>23/06/2022</a:t>
+              <a:t>15/07/2022</a:t>
             </a:fld>
             <a:endParaRPr lang="en-ID"/>
           </a:p>
@@ -2094,7 +2213,7 @@
           <a:p>
             <a:fld id="{101A8BB2-6174-47C5-8A50-12968FF74364}" type="datetimeFigureOut">
               <a:rPr lang="en-ID" smtClean="0"/>
-              <a:t>23/06/2022</a:t>
+              <a:t>15/07/2022</a:t>
             </a:fld>
             <a:endParaRPr lang="en-ID"/>
           </a:p>
@@ -2407,7 +2526,7 @@
           <a:p>
             <a:fld id="{101A8BB2-6174-47C5-8A50-12968FF74364}" type="datetimeFigureOut">
               <a:rPr lang="en-ID" smtClean="0"/>
-              <a:t>23/06/2022</a:t>
+              <a:t>15/07/2022</a:t>
             </a:fld>
             <a:endParaRPr lang="en-ID"/>
           </a:p>
@@ -2696,7 +2815,7 @@
           <a:p>
             <a:fld id="{101A8BB2-6174-47C5-8A50-12968FF74364}" type="datetimeFigureOut">
               <a:rPr lang="en-ID" smtClean="0"/>
-              <a:t>23/06/2022</a:t>
+              <a:t>15/07/2022</a:t>
             </a:fld>
             <a:endParaRPr lang="en-ID"/>
           </a:p>
@@ -2939,7 +3058,7 @@
           <a:p>
             <a:fld id="{101A8BB2-6174-47C5-8A50-12968FF74364}" type="datetimeFigureOut">
               <a:rPr lang="en-ID" smtClean="0"/>
-              <a:t>23/06/2022</a:t>
+              <a:t>15/07/2022</a:t>
             </a:fld>
             <a:endParaRPr lang="en-ID"/>
           </a:p>
@@ -3615,6 +3734,2005 @@
 </file>
 
 <file path=ppt/slides/slide10.xml><?xml version="1.0" encoding="utf-8"?>
+<p:sld xmlns:a="http://schemas.openxmlformats.org/drawingml/2006/main" xmlns:r="http://schemas.openxmlformats.org/officeDocument/2006/relationships" xmlns:p="http://schemas.openxmlformats.org/presentationml/2006/main">
+  <p:cSld>
+    <p:spTree>
+      <p:nvGrpSpPr>
+        <p:cNvPr id="1" name=""/>
+        <p:cNvGrpSpPr/>
+        <p:nvPr/>
+      </p:nvGrpSpPr>
+      <p:grpSpPr>
+        <a:xfrm>
+          <a:off x="0" y="0"/>
+          <a:ext cx="0" cy="0"/>
+          <a:chOff x="0" y="0"/>
+          <a:chExt cx="0" cy="0"/>
+        </a:xfrm>
+      </p:grpSpPr>
+      <p:pic>
+        <p:nvPicPr>
+          <p:cNvPr id="9" name="Picture 8">
+            <a:extLst>
+              <a:ext uri="{FF2B5EF4-FFF2-40B4-BE49-F238E27FC236}">
+                <a16:creationId xmlns:a16="http://schemas.microsoft.com/office/drawing/2014/main" id="{477EA02D-311C-AEF8-E204-F404BFEF283B}"/>
+              </a:ext>
+            </a:extLst>
+          </p:cNvPr>
+          <p:cNvPicPr>
+            <a:picLocks noChangeAspect="1"/>
+          </p:cNvPicPr>
+          <p:nvPr/>
+        </p:nvPicPr>
+        <p:blipFill>
+          <a:blip r:embed="rId2">
+            <a:lum bright="70000" contrast="-70000"/>
+            <a:extLst>
+              <a:ext uri="{28A0092B-C50C-407E-A947-70E740481C1C}">
+                <a14:useLocalDpi xmlns:a14="http://schemas.microsoft.com/office/drawing/2010/main" val="0"/>
+              </a:ext>
+              <a:ext uri="{837473B0-CC2E-450A-ABE3-18F120FF3D39}">
+                <a1611:picAttrSrcUrl xmlns:a1611="http://schemas.microsoft.com/office/drawing/2016/11/main" r:id="rId3"/>
+              </a:ext>
+            </a:extLst>
+          </a:blip>
+          <a:stretch>
+            <a:fillRect/>
+          </a:stretch>
+        </p:blipFill>
+        <p:spPr>
+          <a:xfrm>
+            <a:off x="3707744" y="989668"/>
+            <a:ext cx="5260932" cy="4572000"/>
+          </a:xfrm>
+          <a:prstGeom prst="rect">
+            <a:avLst/>
+          </a:prstGeom>
+        </p:spPr>
+      </p:pic>
+      <p:pic>
+        <p:nvPicPr>
+          <p:cNvPr id="5" name="Picture 4">
+            <a:extLst>
+              <a:ext uri="{FF2B5EF4-FFF2-40B4-BE49-F238E27FC236}">
+                <a16:creationId xmlns:a16="http://schemas.microsoft.com/office/drawing/2014/main" id="{1CE035F3-616F-6528-75E5-E5DFD28DAA8D}"/>
+              </a:ext>
+            </a:extLst>
+          </p:cNvPr>
+          <p:cNvPicPr>
+            <a:picLocks noChangeAspect="1"/>
+          </p:cNvPicPr>
+          <p:nvPr/>
+        </p:nvPicPr>
+        <p:blipFill>
+          <a:blip r:embed="rId4">
+            <a:extLst>
+              <a:ext uri="{BEBA8EAE-BF5A-486C-A8C5-ECC9F3942E4B}">
+                <a14:imgProps xmlns:a14="http://schemas.microsoft.com/office/drawing/2010/main">
+                  <a14:imgLayer r:embed="rId5">
+                    <a14:imgEffect>
+                      <a14:sharpenSoften amount="50000"/>
+                    </a14:imgEffect>
+                    <a14:imgEffect>
+                      <a14:saturation sat="400000"/>
+                    </a14:imgEffect>
+                  </a14:imgLayer>
+                </a14:imgProps>
+              </a:ext>
+              <a:ext uri="{28A0092B-C50C-407E-A947-70E740481C1C}">
+                <a14:useLocalDpi xmlns:a14="http://schemas.microsoft.com/office/drawing/2010/main" val="0"/>
+              </a:ext>
+              <a:ext uri="{837473B0-CC2E-450A-ABE3-18F120FF3D39}">
+                <a1611:picAttrSrcUrl xmlns:a1611="http://schemas.microsoft.com/office/drawing/2016/11/main" r:id="rId6"/>
+              </a:ext>
+            </a:extLst>
+          </a:blip>
+          <a:stretch>
+            <a:fillRect/>
+          </a:stretch>
+        </p:blipFill>
+        <p:spPr>
+          <a:xfrm>
+            <a:off x="387683" y="228600"/>
+            <a:ext cx="1368926" cy="914400"/>
+          </a:xfrm>
+          <a:prstGeom prst="rect">
+            <a:avLst/>
+          </a:prstGeom>
+        </p:spPr>
+      </p:pic>
+      <p:sp>
+        <p:nvSpPr>
+          <p:cNvPr id="8" name="TextBox 7">
+            <a:extLst>
+              <a:ext uri="{FF2B5EF4-FFF2-40B4-BE49-F238E27FC236}">
+                <a16:creationId xmlns:a16="http://schemas.microsoft.com/office/drawing/2014/main" id="{307471AE-41B6-710A-8B15-AC379FFDE746}"/>
+              </a:ext>
+            </a:extLst>
+          </p:cNvPr>
+          <p:cNvSpPr txBox="1"/>
+          <p:nvPr/>
+        </p:nvSpPr>
+        <p:spPr>
+          <a:xfrm>
+            <a:off x="3896191" y="331857"/>
+            <a:ext cx="4399618" cy="1323439"/>
+          </a:xfrm>
+          <a:prstGeom prst="rect">
+            <a:avLst/>
+          </a:prstGeom>
+          <a:noFill/>
+        </p:spPr>
+        <p:txBody>
+          <a:bodyPr wrap="square" rtlCol="0">
+            <a:spAutoFit/>
+          </a:bodyPr>
+          <a:lstStyle/>
+          <a:p>
+            <a:pPr algn="ctr"/>
+            <a:r>
+              <a:rPr lang="en-US" sz="4000" b="1" dirty="0"/>
+              <a:t>OVERVIEW SISTEM MEMBER CARD</a:t>
+            </a:r>
+            <a:endParaRPr lang="en-ID" sz="4000" b="1" dirty="0"/>
+          </a:p>
+        </p:txBody>
+      </p:sp>
+      <p:grpSp>
+        <p:nvGrpSpPr>
+          <p:cNvPr id="15" name="Group 14">
+            <a:extLst>
+              <a:ext uri="{FF2B5EF4-FFF2-40B4-BE49-F238E27FC236}">
+                <a16:creationId xmlns:a16="http://schemas.microsoft.com/office/drawing/2014/main" id="{16140E97-1075-2C65-CCCE-1E771A931C55}"/>
+              </a:ext>
+            </a:extLst>
+          </p:cNvPr>
+          <p:cNvGrpSpPr/>
+          <p:nvPr/>
+        </p:nvGrpSpPr>
+        <p:grpSpPr>
+          <a:xfrm>
+            <a:off x="5347558" y="2589281"/>
+            <a:ext cx="1981304" cy="1679437"/>
+            <a:chOff x="1858650" y="2934450"/>
+            <a:chExt cx="1684203" cy="1684203"/>
+          </a:xfrm>
+        </p:grpSpPr>
+        <p:pic>
+          <p:nvPicPr>
+            <p:cNvPr id="16" name="Picture 15">
+              <a:extLst>
+                <a:ext uri="{FF2B5EF4-FFF2-40B4-BE49-F238E27FC236}">
+                  <a16:creationId xmlns:a16="http://schemas.microsoft.com/office/drawing/2014/main" id="{C6B83146-9EC5-5022-30B3-FB4F621C1C10}"/>
+                </a:ext>
+              </a:extLst>
+            </p:cNvPr>
+            <p:cNvPicPr>
+              <a:picLocks noChangeAspect="1"/>
+            </p:cNvPicPr>
+            <p:nvPr/>
+          </p:nvPicPr>
+          <p:blipFill>
+            <a:blip r:embed="rId7">
+              <a:lum bright="70000" contrast="-70000"/>
+              <a:extLst>
+                <a:ext uri="{BEBA8EAE-BF5A-486C-A8C5-ECC9F3942E4B}">
+                  <a14:imgProps xmlns:a14="http://schemas.microsoft.com/office/drawing/2010/main">
+                    <a14:imgLayer r:embed="rId8">
+                      <a14:imgEffect>
+                        <a14:sharpenSoften amount="50000"/>
+                      </a14:imgEffect>
+                    </a14:imgLayer>
+                  </a14:imgProps>
+                </a:ext>
+                <a:ext uri="{28A0092B-C50C-407E-A947-70E740481C1C}">
+                  <a14:useLocalDpi xmlns:a14="http://schemas.microsoft.com/office/drawing/2010/main" val="0"/>
+                </a:ext>
+              </a:extLst>
+            </a:blip>
+            <a:stretch>
+              <a:fillRect/>
+            </a:stretch>
+          </p:blipFill>
+          <p:spPr>
+            <a:xfrm>
+              <a:off x="1858650" y="2934450"/>
+              <a:ext cx="1684203" cy="1684203"/>
+            </a:xfrm>
+            <a:prstGeom prst="rect">
+              <a:avLst/>
+            </a:prstGeom>
+          </p:spPr>
+        </p:pic>
+        <p:pic>
+          <p:nvPicPr>
+            <p:cNvPr id="17" name="Picture 16">
+              <a:extLst>
+                <a:ext uri="{FF2B5EF4-FFF2-40B4-BE49-F238E27FC236}">
+                  <a16:creationId xmlns:a16="http://schemas.microsoft.com/office/drawing/2014/main" id="{082F2924-4185-9AAF-E4BA-6B6C51A1B1CC}"/>
+                </a:ext>
+              </a:extLst>
+            </p:cNvPr>
+            <p:cNvPicPr>
+              <a:picLocks noChangeAspect="1"/>
+            </p:cNvPicPr>
+            <p:nvPr/>
+          </p:nvPicPr>
+          <p:blipFill>
+            <a:blip r:embed="rId4">
+              <a:extLst>
+                <a:ext uri="{BEBA8EAE-BF5A-486C-A8C5-ECC9F3942E4B}">
+                  <a14:imgProps xmlns:a14="http://schemas.microsoft.com/office/drawing/2010/main">
+                    <a14:imgLayer r:embed="rId5">
+                      <a14:imgEffect>
+                        <a14:sharpenSoften amount="50000"/>
+                      </a14:imgEffect>
+                      <a14:imgEffect>
+                        <a14:saturation sat="400000"/>
+                      </a14:imgEffect>
+                    </a14:imgLayer>
+                  </a14:imgProps>
+                </a:ext>
+                <a:ext uri="{28A0092B-C50C-407E-A947-70E740481C1C}">
+                  <a14:useLocalDpi xmlns:a14="http://schemas.microsoft.com/office/drawing/2010/main" val="0"/>
+                </a:ext>
+                <a:ext uri="{837473B0-CC2E-450A-ABE3-18F120FF3D39}">
+                  <a1611:picAttrSrcUrl xmlns:a1611="http://schemas.microsoft.com/office/drawing/2016/11/main" r:id="rId6"/>
+                </a:ext>
+              </a:extLst>
+            </a:blip>
+            <a:stretch>
+              <a:fillRect/>
+            </a:stretch>
+          </p:blipFill>
+          <p:spPr>
+            <a:xfrm>
+              <a:off x="2906733" y="3193200"/>
+              <a:ext cx="420229" cy="280700"/>
+            </a:xfrm>
+            <a:prstGeom prst="rect">
+              <a:avLst/>
+            </a:prstGeom>
+          </p:spPr>
+        </p:pic>
+      </p:grpSp>
+      <p:pic>
+        <p:nvPicPr>
+          <p:cNvPr id="19" name="Picture 18">
+            <a:extLst>
+              <a:ext uri="{FF2B5EF4-FFF2-40B4-BE49-F238E27FC236}">
+                <a16:creationId xmlns:a16="http://schemas.microsoft.com/office/drawing/2014/main" id="{896DF21A-A059-5B91-2C11-DA1ED02FCBAD}"/>
+              </a:ext>
+            </a:extLst>
+          </p:cNvPr>
+          <p:cNvPicPr>
+            <a:picLocks noChangeAspect="1"/>
+          </p:cNvPicPr>
+          <p:nvPr/>
+        </p:nvPicPr>
+        <p:blipFill>
+          <a:blip r:embed="rId9">
+            <a:lum bright="70000" contrast="-70000"/>
+            <a:extLst>
+              <a:ext uri="{28A0092B-C50C-407E-A947-70E740481C1C}">
+                <a14:useLocalDpi xmlns:a14="http://schemas.microsoft.com/office/drawing/2010/main" val="0"/>
+              </a:ext>
+            </a:extLst>
+          </a:blip>
+          <a:stretch>
+            <a:fillRect/>
+          </a:stretch>
+        </p:blipFill>
+        <p:spPr>
+          <a:xfrm>
+            <a:off x="3900115" y="1143000"/>
+            <a:ext cx="4876190" cy="4876190"/>
+          </a:xfrm>
+          <a:prstGeom prst="rect">
+            <a:avLst/>
+          </a:prstGeom>
+        </p:spPr>
+      </p:pic>
+    </p:spTree>
+    <p:extLst>
+      <p:ext uri="{BB962C8B-B14F-4D97-AF65-F5344CB8AC3E}">
+        <p14:creationId xmlns:p14="http://schemas.microsoft.com/office/powerpoint/2010/main" val="959585968"/>
+      </p:ext>
+    </p:extLst>
+  </p:cSld>
+  <p:clrMapOvr>
+    <a:masterClrMapping/>
+  </p:clrMapOvr>
+  <mc:AlternateContent xmlns:mc="http://schemas.openxmlformats.org/markup-compatibility/2006" xmlns:p159="http://schemas.microsoft.com/office/powerpoint/2015/09/main">
+    <mc:Choice Requires="p159">
+      <p:transition xmlns:p14="http://schemas.microsoft.com/office/powerpoint/2010/main" spd="slow" p14:dur="2000">
+        <p159:morph option="byObject"/>
+      </p:transition>
+    </mc:Choice>
+    <mc:Fallback xmlns="">
+      <p:transition spd="slow">
+        <p:fade/>
+      </p:transition>
+    </mc:Fallback>
+  </mc:AlternateContent>
+</p:sld>
+</file>
+
+<file path=ppt/slides/slide11.xml><?xml version="1.0" encoding="utf-8"?>
+<p:sld xmlns:a="http://schemas.openxmlformats.org/drawingml/2006/main" xmlns:r="http://schemas.openxmlformats.org/officeDocument/2006/relationships" xmlns:p="http://schemas.openxmlformats.org/presentationml/2006/main">
+  <p:cSld>
+    <p:spTree>
+      <p:nvGrpSpPr>
+        <p:cNvPr id="1" name=""/>
+        <p:cNvGrpSpPr/>
+        <p:nvPr/>
+      </p:nvGrpSpPr>
+      <p:grpSpPr>
+        <a:xfrm>
+          <a:off x="0" y="0"/>
+          <a:ext cx="0" cy="0"/>
+          <a:chOff x="0" y="0"/>
+          <a:chExt cx="0" cy="0"/>
+        </a:xfrm>
+      </p:grpSpPr>
+      <p:pic>
+        <p:nvPicPr>
+          <p:cNvPr id="9" name="Picture 8">
+            <a:extLst>
+              <a:ext uri="{FF2B5EF4-FFF2-40B4-BE49-F238E27FC236}">
+                <a16:creationId xmlns:a16="http://schemas.microsoft.com/office/drawing/2014/main" id="{477EA02D-311C-AEF8-E204-F404BFEF283B}"/>
+              </a:ext>
+            </a:extLst>
+          </p:cNvPr>
+          <p:cNvPicPr>
+            <a:picLocks noChangeAspect="1"/>
+          </p:cNvPicPr>
+          <p:nvPr/>
+        </p:nvPicPr>
+        <p:blipFill>
+          <a:blip r:embed="rId2">
+            <a:lum bright="70000" contrast="-70000"/>
+            <a:extLst>
+              <a:ext uri="{28A0092B-C50C-407E-A947-70E740481C1C}">
+                <a14:useLocalDpi xmlns:a14="http://schemas.microsoft.com/office/drawing/2010/main" val="0"/>
+              </a:ext>
+              <a:ext uri="{837473B0-CC2E-450A-ABE3-18F120FF3D39}">
+                <a1611:picAttrSrcUrl xmlns:a1611="http://schemas.microsoft.com/office/drawing/2016/11/main" r:id="rId3"/>
+              </a:ext>
+            </a:extLst>
+          </a:blip>
+          <a:stretch>
+            <a:fillRect/>
+          </a:stretch>
+        </p:blipFill>
+        <p:spPr>
+          <a:xfrm>
+            <a:off x="3707744" y="989668"/>
+            <a:ext cx="5260932" cy="4572000"/>
+          </a:xfrm>
+          <a:prstGeom prst="rect">
+            <a:avLst/>
+          </a:prstGeom>
+        </p:spPr>
+      </p:pic>
+      <p:pic>
+        <p:nvPicPr>
+          <p:cNvPr id="5" name="Picture 4">
+            <a:extLst>
+              <a:ext uri="{FF2B5EF4-FFF2-40B4-BE49-F238E27FC236}">
+                <a16:creationId xmlns:a16="http://schemas.microsoft.com/office/drawing/2014/main" id="{1CE035F3-616F-6528-75E5-E5DFD28DAA8D}"/>
+              </a:ext>
+            </a:extLst>
+          </p:cNvPr>
+          <p:cNvPicPr>
+            <a:picLocks noChangeAspect="1"/>
+          </p:cNvPicPr>
+          <p:nvPr/>
+        </p:nvPicPr>
+        <p:blipFill>
+          <a:blip r:embed="rId4">
+            <a:extLst>
+              <a:ext uri="{BEBA8EAE-BF5A-486C-A8C5-ECC9F3942E4B}">
+                <a14:imgProps xmlns:a14="http://schemas.microsoft.com/office/drawing/2010/main">
+                  <a14:imgLayer r:embed="rId5">
+                    <a14:imgEffect>
+                      <a14:sharpenSoften amount="50000"/>
+                    </a14:imgEffect>
+                    <a14:imgEffect>
+                      <a14:saturation sat="400000"/>
+                    </a14:imgEffect>
+                  </a14:imgLayer>
+                </a14:imgProps>
+              </a:ext>
+              <a:ext uri="{28A0092B-C50C-407E-A947-70E740481C1C}">
+                <a14:useLocalDpi xmlns:a14="http://schemas.microsoft.com/office/drawing/2010/main" val="0"/>
+              </a:ext>
+              <a:ext uri="{837473B0-CC2E-450A-ABE3-18F120FF3D39}">
+                <a1611:picAttrSrcUrl xmlns:a1611="http://schemas.microsoft.com/office/drawing/2016/11/main" r:id="rId6"/>
+              </a:ext>
+            </a:extLst>
+          </a:blip>
+          <a:stretch>
+            <a:fillRect/>
+          </a:stretch>
+        </p:blipFill>
+        <p:spPr>
+          <a:xfrm>
+            <a:off x="387683" y="228600"/>
+            <a:ext cx="1368926" cy="914400"/>
+          </a:xfrm>
+          <a:prstGeom prst="rect">
+            <a:avLst/>
+          </a:prstGeom>
+        </p:spPr>
+      </p:pic>
+      <p:sp>
+        <p:nvSpPr>
+          <p:cNvPr id="8" name="TextBox 7">
+            <a:extLst>
+              <a:ext uri="{FF2B5EF4-FFF2-40B4-BE49-F238E27FC236}">
+                <a16:creationId xmlns:a16="http://schemas.microsoft.com/office/drawing/2014/main" id="{307471AE-41B6-710A-8B15-AC379FFDE746}"/>
+              </a:ext>
+            </a:extLst>
+          </p:cNvPr>
+          <p:cNvSpPr txBox="1"/>
+          <p:nvPr/>
+        </p:nvSpPr>
+        <p:spPr>
+          <a:xfrm>
+            <a:off x="3896191" y="331857"/>
+            <a:ext cx="4399618" cy="1323439"/>
+          </a:xfrm>
+          <a:prstGeom prst="rect">
+            <a:avLst/>
+          </a:prstGeom>
+          <a:noFill/>
+        </p:spPr>
+        <p:txBody>
+          <a:bodyPr wrap="square" rtlCol="0">
+            <a:spAutoFit/>
+          </a:bodyPr>
+          <a:lstStyle/>
+          <a:p>
+            <a:pPr algn="ctr"/>
+            <a:r>
+              <a:rPr lang="en-US" sz="4000" b="1" dirty="0"/>
+              <a:t>OVERVIEW SISTEM MEMBER CARD</a:t>
+            </a:r>
+            <a:endParaRPr lang="en-ID" sz="4000" b="1" dirty="0"/>
+          </a:p>
+        </p:txBody>
+      </p:sp>
+      <p:grpSp>
+        <p:nvGrpSpPr>
+          <p:cNvPr id="15" name="Group 14">
+            <a:extLst>
+              <a:ext uri="{FF2B5EF4-FFF2-40B4-BE49-F238E27FC236}">
+                <a16:creationId xmlns:a16="http://schemas.microsoft.com/office/drawing/2014/main" id="{16140E97-1075-2C65-CCCE-1E771A931C55}"/>
+              </a:ext>
+            </a:extLst>
+          </p:cNvPr>
+          <p:cNvGrpSpPr/>
+          <p:nvPr/>
+        </p:nvGrpSpPr>
+        <p:grpSpPr>
+          <a:xfrm>
+            <a:off x="7234528" y="2589280"/>
+            <a:ext cx="1981304" cy="1679437"/>
+            <a:chOff x="1858650" y="2934450"/>
+            <a:chExt cx="1684203" cy="1684203"/>
+          </a:xfrm>
+        </p:grpSpPr>
+        <p:pic>
+          <p:nvPicPr>
+            <p:cNvPr id="16" name="Picture 15">
+              <a:extLst>
+                <a:ext uri="{FF2B5EF4-FFF2-40B4-BE49-F238E27FC236}">
+                  <a16:creationId xmlns:a16="http://schemas.microsoft.com/office/drawing/2014/main" id="{C6B83146-9EC5-5022-30B3-FB4F621C1C10}"/>
+                </a:ext>
+              </a:extLst>
+            </p:cNvPr>
+            <p:cNvPicPr>
+              <a:picLocks noChangeAspect="1"/>
+            </p:cNvPicPr>
+            <p:nvPr/>
+          </p:nvPicPr>
+          <p:blipFill>
+            <a:blip r:embed="rId7">
+              <a:lum bright="70000" contrast="-70000"/>
+              <a:extLst>
+                <a:ext uri="{BEBA8EAE-BF5A-486C-A8C5-ECC9F3942E4B}">
+                  <a14:imgProps xmlns:a14="http://schemas.microsoft.com/office/drawing/2010/main">
+                    <a14:imgLayer r:embed="rId8">
+                      <a14:imgEffect>
+                        <a14:sharpenSoften amount="50000"/>
+                      </a14:imgEffect>
+                    </a14:imgLayer>
+                  </a14:imgProps>
+                </a:ext>
+                <a:ext uri="{28A0092B-C50C-407E-A947-70E740481C1C}">
+                  <a14:useLocalDpi xmlns:a14="http://schemas.microsoft.com/office/drawing/2010/main" val="0"/>
+                </a:ext>
+              </a:extLst>
+            </a:blip>
+            <a:stretch>
+              <a:fillRect/>
+            </a:stretch>
+          </p:blipFill>
+          <p:spPr>
+            <a:xfrm>
+              <a:off x="1858650" y="2934450"/>
+              <a:ext cx="1684203" cy="1684203"/>
+            </a:xfrm>
+            <a:prstGeom prst="rect">
+              <a:avLst/>
+            </a:prstGeom>
+          </p:spPr>
+        </p:pic>
+        <p:pic>
+          <p:nvPicPr>
+            <p:cNvPr id="17" name="Picture 16">
+              <a:extLst>
+                <a:ext uri="{FF2B5EF4-FFF2-40B4-BE49-F238E27FC236}">
+                  <a16:creationId xmlns:a16="http://schemas.microsoft.com/office/drawing/2014/main" id="{082F2924-4185-9AAF-E4BA-6B6C51A1B1CC}"/>
+                </a:ext>
+              </a:extLst>
+            </p:cNvPr>
+            <p:cNvPicPr>
+              <a:picLocks noChangeAspect="1"/>
+            </p:cNvPicPr>
+            <p:nvPr/>
+          </p:nvPicPr>
+          <p:blipFill>
+            <a:blip r:embed="rId4">
+              <a:extLst>
+                <a:ext uri="{BEBA8EAE-BF5A-486C-A8C5-ECC9F3942E4B}">
+                  <a14:imgProps xmlns:a14="http://schemas.microsoft.com/office/drawing/2010/main">
+                    <a14:imgLayer r:embed="rId5">
+                      <a14:imgEffect>
+                        <a14:sharpenSoften amount="50000"/>
+                      </a14:imgEffect>
+                      <a14:imgEffect>
+                        <a14:saturation sat="400000"/>
+                      </a14:imgEffect>
+                    </a14:imgLayer>
+                  </a14:imgProps>
+                </a:ext>
+                <a:ext uri="{28A0092B-C50C-407E-A947-70E740481C1C}">
+                  <a14:useLocalDpi xmlns:a14="http://schemas.microsoft.com/office/drawing/2010/main" val="0"/>
+                </a:ext>
+                <a:ext uri="{837473B0-CC2E-450A-ABE3-18F120FF3D39}">
+                  <a1611:picAttrSrcUrl xmlns:a1611="http://schemas.microsoft.com/office/drawing/2016/11/main" r:id="rId6"/>
+                </a:ext>
+              </a:extLst>
+            </a:blip>
+            <a:stretch>
+              <a:fillRect/>
+            </a:stretch>
+          </p:blipFill>
+          <p:spPr>
+            <a:xfrm>
+              <a:off x="2906733" y="3193200"/>
+              <a:ext cx="420229" cy="280700"/>
+            </a:xfrm>
+            <a:prstGeom prst="rect">
+              <a:avLst/>
+            </a:prstGeom>
+          </p:spPr>
+        </p:pic>
+      </p:grpSp>
+      <p:sp>
+        <p:nvSpPr>
+          <p:cNvPr id="12" name="TextBox 11">
+            <a:extLst>
+              <a:ext uri="{FF2B5EF4-FFF2-40B4-BE49-F238E27FC236}">
+                <a16:creationId xmlns:a16="http://schemas.microsoft.com/office/drawing/2014/main" id="{BC7F22A3-D4C3-18CA-C25B-26E16A9CD8F9}"/>
+              </a:ext>
+            </a:extLst>
+          </p:cNvPr>
+          <p:cNvSpPr txBox="1"/>
+          <p:nvPr/>
+        </p:nvSpPr>
+        <p:spPr>
+          <a:xfrm>
+            <a:off x="3460588" y="4840403"/>
+            <a:ext cx="5755243" cy="707886"/>
+          </a:xfrm>
+          <a:prstGeom prst="rect">
+            <a:avLst/>
+          </a:prstGeom>
+          <a:noFill/>
+        </p:spPr>
+        <p:txBody>
+          <a:bodyPr wrap="square" rtlCol="0">
+            <a:spAutoFit/>
+          </a:bodyPr>
+          <a:lstStyle/>
+          <a:p>
+            <a:pPr algn="ctr"/>
+            <a:r>
+              <a:rPr lang="en-US" sz="4000" b="1" dirty="0" err="1">
+                <a:solidFill>
+                  <a:schemeClr val="tx1">
+                    <a:lumMod val="50000"/>
+                    <a:lumOff val="50000"/>
+                  </a:schemeClr>
+                </a:solidFill>
+              </a:rPr>
+              <a:t>Aplikasi</a:t>
+            </a:r>
+            <a:r>
+              <a:rPr lang="en-US" sz="4000" b="1" dirty="0">
+                <a:solidFill>
+                  <a:schemeClr val="tx1">
+                    <a:lumMod val="50000"/>
+                    <a:lumOff val="50000"/>
+                  </a:schemeClr>
+                </a:solidFill>
+              </a:rPr>
+              <a:t> B2B</a:t>
+            </a:r>
+          </a:p>
+        </p:txBody>
+      </p:sp>
+      <p:pic>
+        <p:nvPicPr>
+          <p:cNvPr id="3" name="Picture 2">
+            <a:extLst>
+              <a:ext uri="{FF2B5EF4-FFF2-40B4-BE49-F238E27FC236}">
+                <a16:creationId xmlns:a16="http://schemas.microsoft.com/office/drawing/2014/main" id="{2B48CF25-884A-D0BE-E794-BCB1458D0306}"/>
+              </a:ext>
+            </a:extLst>
+          </p:cNvPr>
+          <p:cNvPicPr>
+            <a:picLocks noChangeAspect="1"/>
+          </p:cNvPicPr>
+          <p:nvPr/>
+        </p:nvPicPr>
+        <p:blipFill>
+          <a:blip r:embed="rId9">
+            <a:lum bright="70000" contrast="-70000"/>
+            <a:extLst>
+              <a:ext uri="{28A0092B-C50C-407E-A947-70E740481C1C}">
+                <a14:useLocalDpi xmlns:a14="http://schemas.microsoft.com/office/drawing/2010/main" val="0"/>
+              </a:ext>
+            </a:extLst>
+          </a:blip>
+          <a:stretch>
+            <a:fillRect/>
+          </a:stretch>
+        </p:blipFill>
+        <p:spPr>
+          <a:xfrm>
+            <a:off x="3460588" y="2275613"/>
+            <a:ext cx="2306772" cy="2306772"/>
+          </a:xfrm>
+          <a:prstGeom prst="rect">
+            <a:avLst/>
+          </a:prstGeom>
+        </p:spPr>
+      </p:pic>
+      <p:sp>
+        <p:nvSpPr>
+          <p:cNvPr id="11" name="TextBox 10">
+            <a:extLst>
+              <a:ext uri="{FF2B5EF4-FFF2-40B4-BE49-F238E27FC236}">
+                <a16:creationId xmlns:a16="http://schemas.microsoft.com/office/drawing/2014/main" id="{12356377-A335-B716-10D6-CCD12A248115}"/>
+              </a:ext>
+            </a:extLst>
+          </p:cNvPr>
+          <p:cNvSpPr txBox="1"/>
+          <p:nvPr/>
+        </p:nvSpPr>
+        <p:spPr>
+          <a:xfrm>
+            <a:off x="6190935" y="2921725"/>
+            <a:ext cx="467413" cy="707886"/>
+          </a:xfrm>
+          <a:prstGeom prst="rect">
+            <a:avLst/>
+          </a:prstGeom>
+          <a:noFill/>
+        </p:spPr>
+        <p:txBody>
+          <a:bodyPr wrap="square" rtlCol="0">
+            <a:spAutoFit/>
+          </a:bodyPr>
+          <a:lstStyle/>
+          <a:p>
+            <a:r>
+              <a:rPr lang="en-US" sz="4000" b="1" dirty="0">
+                <a:solidFill>
+                  <a:srgbClr val="CDCDCD"/>
+                </a:solidFill>
+              </a:rPr>
+              <a:t>+</a:t>
+            </a:r>
+          </a:p>
+        </p:txBody>
+      </p:sp>
+    </p:spTree>
+    <p:extLst>
+      <p:ext uri="{BB962C8B-B14F-4D97-AF65-F5344CB8AC3E}">
+        <p14:creationId xmlns:p14="http://schemas.microsoft.com/office/powerpoint/2010/main" val="689482080"/>
+      </p:ext>
+    </p:extLst>
+  </p:cSld>
+  <p:clrMapOvr>
+    <a:masterClrMapping/>
+  </p:clrMapOvr>
+  <mc:AlternateContent xmlns:mc="http://schemas.openxmlformats.org/markup-compatibility/2006" xmlns:p159="http://schemas.microsoft.com/office/powerpoint/2015/09/main">
+    <mc:Choice Requires="p159">
+      <p:transition xmlns:p14="http://schemas.microsoft.com/office/powerpoint/2010/main" spd="slow" p14:dur="2000">
+        <p159:morph option="byObject"/>
+      </p:transition>
+    </mc:Choice>
+    <mc:Fallback xmlns="">
+      <p:transition spd="slow">
+        <p:fade/>
+      </p:transition>
+    </mc:Fallback>
+  </mc:AlternateContent>
+</p:sld>
+</file>
+
+<file path=ppt/slides/slide12.xml><?xml version="1.0" encoding="utf-8"?>
+<p:sld xmlns:a="http://schemas.openxmlformats.org/drawingml/2006/main" xmlns:r="http://schemas.openxmlformats.org/officeDocument/2006/relationships" xmlns:p="http://schemas.openxmlformats.org/presentationml/2006/main">
+  <p:cSld>
+    <p:spTree>
+      <p:nvGrpSpPr>
+        <p:cNvPr id="1" name=""/>
+        <p:cNvGrpSpPr/>
+        <p:nvPr/>
+      </p:nvGrpSpPr>
+      <p:grpSpPr>
+        <a:xfrm>
+          <a:off x="0" y="0"/>
+          <a:ext cx="0" cy="0"/>
+          <a:chOff x="0" y="0"/>
+          <a:chExt cx="0" cy="0"/>
+        </a:xfrm>
+      </p:grpSpPr>
+      <p:pic>
+        <p:nvPicPr>
+          <p:cNvPr id="9" name="Picture 8">
+            <a:extLst>
+              <a:ext uri="{FF2B5EF4-FFF2-40B4-BE49-F238E27FC236}">
+                <a16:creationId xmlns:a16="http://schemas.microsoft.com/office/drawing/2014/main" id="{477EA02D-311C-AEF8-E204-F404BFEF283B}"/>
+              </a:ext>
+            </a:extLst>
+          </p:cNvPr>
+          <p:cNvPicPr>
+            <a:picLocks noChangeAspect="1"/>
+          </p:cNvPicPr>
+          <p:nvPr/>
+        </p:nvPicPr>
+        <p:blipFill>
+          <a:blip r:embed="rId2">
+            <a:lum bright="70000" contrast="-70000"/>
+            <a:extLst>
+              <a:ext uri="{28A0092B-C50C-407E-A947-70E740481C1C}">
+                <a14:useLocalDpi xmlns:a14="http://schemas.microsoft.com/office/drawing/2010/main" val="0"/>
+              </a:ext>
+              <a:ext uri="{837473B0-CC2E-450A-ABE3-18F120FF3D39}">
+                <a1611:picAttrSrcUrl xmlns:a1611="http://schemas.microsoft.com/office/drawing/2016/11/main" r:id="rId3"/>
+              </a:ext>
+            </a:extLst>
+          </a:blip>
+          <a:stretch>
+            <a:fillRect/>
+          </a:stretch>
+        </p:blipFill>
+        <p:spPr>
+          <a:xfrm>
+            <a:off x="3707744" y="989668"/>
+            <a:ext cx="5260932" cy="4572000"/>
+          </a:xfrm>
+          <a:prstGeom prst="rect">
+            <a:avLst/>
+          </a:prstGeom>
+        </p:spPr>
+      </p:pic>
+      <p:pic>
+        <p:nvPicPr>
+          <p:cNvPr id="5" name="Picture 4">
+            <a:extLst>
+              <a:ext uri="{FF2B5EF4-FFF2-40B4-BE49-F238E27FC236}">
+                <a16:creationId xmlns:a16="http://schemas.microsoft.com/office/drawing/2014/main" id="{1CE035F3-616F-6528-75E5-E5DFD28DAA8D}"/>
+              </a:ext>
+            </a:extLst>
+          </p:cNvPr>
+          <p:cNvPicPr>
+            <a:picLocks noChangeAspect="1"/>
+          </p:cNvPicPr>
+          <p:nvPr/>
+        </p:nvPicPr>
+        <p:blipFill>
+          <a:blip r:embed="rId4">
+            <a:extLst>
+              <a:ext uri="{BEBA8EAE-BF5A-486C-A8C5-ECC9F3942E4B}">
+                <a14:imgProps xmlns:a14="http://schemas.microsoft.com/office/drawing/2010/main">
+                  <a14:imgLayer r:embed="rId5">
+                    <a14:imgEffect>
+                      <a14:sharpenSoften amount="50000"/>
+                    </a14:imgEffect>
+                    <a14:imgEffect>
+                      <a14:saturation sat="400000"/>
+                    </a14:imgEffect>
+                  </a14:imgLayer>
+                </a14:imgProps>
+              </a:ext>
+              <a:ext uri="{28A0092B-C50C-407E-A947-70E740481C1C}">
+                <a14:useLocalDpi xmlns:a14="http://schemas.microsoft.com/office/drawing/2010/main" val="0"/>
+              </a:ext>
+              <a:ext uri="{837473B0-CC2E-450A-ABE3-18F120FF3D39}">
+                <a1611:picAttrSrcUrl xmlns:a1611="http://schemas.microsoft.com/office/drawing/2016/11/main" r:id="rId6"/>
+              </a:ext>
+            </a:extLst>
+          </a:blip>
+          <a:stretch>
+            <a:fillRect/>
+          </a:stretch>
+        </p:blipFill>
+        <p:spPr>
+          <a:xfrm>
+            <a:off x="387683" y="228600"/>
+            <a:ext cx="1368926" cy="914400"/>
+          </a:xfrm>
+          <a:prstGeom prst="rect">
+            <a:avLst/>
+          </a:prstGeom>
+        </p:spPr>
+      </p:pic>
+      <p:sp>
+        <p:nvSpPr>
+          <p:cNvPr id="8" name="TextBox 7">
+            <a:extLst>
+              <a:ext uri="{FF2B5EF4-FFF2-40B4-BE49-F238E27FC236}">
+                <a16:creationId xmlns:a16="http://schemas.microsoft.com/office/drawing/2014/main" id="{307471AE-41B6-710A-8B15-AC379FFDE746}"/>
+              </a:ext>
+            </a:extLst>
+          </p:cNvPr>
+          <p:cNvSpPr txBox="1"/>
+          <p:nvPr/>
+        </p:nvSpPr>
+        <p:spPr>
+          <a:xfrm>
+            <a:off x="3896191" y="331857"/>
+            <a:ext cx="4399618" cy="1323439"/>
+          </a:xfrm>
+          <a:prstGeom prst="rect">
+            <a:avLst/>
+          </a:prstGeom>
+          <a:noFill/>
+        </p:spPr>
+        <p:txBody>
+          <a:bodyPr wrap="square" rtlCol="0">
+            <a:spAutoFit/>
+          </a:bodyPr>
+          <a:lstStyle/>
+          <a:p>
+            <a:pPr algn="ctr"/>
+            <a:r>
+              <a:rPr lang="en-US" sz="4000" b="1" dirty="0"/>
+              <a:t>OVERVIEW SISTEM MEMBER CARD</a:t>
+            </a:r>
+            <a:endParaRPr lang="en-ID" sz="4000" b="1" dirty="0"/>
+          </a:p>
+        </p:txBody>
+      </p:sp>
+      <p:grpSp>
+        <p:nvGrpSpPr>
+          <p:cNvPr id="15" name="Group 14">
+            <a:extLst>
+              <a:ext uri="{FF2B5EF4-FFF2-40B4-BE49-F238E27FC236}">
+                <a16:creationId xmlns:a16="http://schemas.microsoft.com/office/drawing/2014/main" id="{16140E97-1075-2C65-CCCE-1E771A931C55}"/>
+              </a:ext>
+            </a:extLst>
+          </p:cNvPr>
+          <p:cNvGrpSpPr/>
+          <p:nvPr/>
+        </p:nvGrpSpPr>
+        <p:grpSpPr>
+          <a:xfrm>
+            <a:off x="4114696" y="2589281"/>
+            <a:ext cx="1981304" cy="1679437"/>
+            <a:chOff x="1858650" y="2934450"/>
+            <a:chExt cx="1684203" cy="1684203"/>
+          </a:xfrm>
+        </p:grpSpPr>
+        <p:pic>
+          <p:nvPicPr>
+            <p:cNvPr id="16" name="Picture 15">
+              <a:extLst>
+                <a:ext uri="{FF2B5EF4-FFF2-40B4-BE49-F238E27FC236}">
+                  <a16:creationId xmlns:a16="http://schemas.microsoft.com/office/drawing/2014/main" id="{C6B83146-9EC5-5022-30B3-FB4F621C1C10}"/>
+                </a:ext>
+              </a:extLst>
+            </p:cNvPr>
+            <p:cNvPicPr>
+              <a:picLocks noChangeAspect="1"/>
+            </p:cNvPicPr>
+            <p:nvPr/>
+          </p:nvPicPr>
+          <p:blipFill>
+            <a:blip r:embed="rId7">
+              <a:lum bright="70000" contrast="-70000"/>
+              <a:extLst>
+                <a:ext uri="{BEBA8EAE-BF5A-486C-A8C5-ECC9F3942E4B}">
+                  <a14:imgProps xmlns:a14="http://schemas.microsoft.com/office/drawing/2010/main">
+                    <a14:imgLayer r:embed="rId8">
+                      <a14:imgEffect>
+                        <a14:sharpenSoften amount="50000"/>
+                      </a14:imgEffect>
+                    </a14:imgLayer>
+                  </a14:imgProps>
+                </a:ext>
+                <a:ext uri="{28A0092B-C50C-407E-A947-70E740481C1C}">
+                  <a14:useLocalDpi xmlns:a14="http://schemas.microsoft.com/office/drawing/2010/main" val="0"/>
+                </a:ext>
+              </a:extLst>
+            </a:blip>
+            <a:stretch>
+              <a:fillRect/>
+            </a:stretch>
+          </p:blipFill>
+          <p:spPr>
+            <a:xfrm>
+              <a:off x="1858650" y="2934450"/>
+              <a:ext cx="1684203" cy="1684203"/>
+            </a:xfrm>
+            <a:prstGeom prst="rect">
+              <a:avLst/>
+            </a:prstGeom>
+          </p:spPr>
+        </p:pic>
+        <p:pic>
+          <p:nvPicPr>
+            <p:cNvPr id="17" name="Picture 16">
+              <a:extLst>
+                <a:ext uri="{FF2B5EF4-FFF2-40B4-BE49-F238E27FC236}">
+                  <a16:creationId xmlns:a16="http://schemas.microsoft.com/office/drawing/2014/main" id="{082F2924-4185-9AAF-E4BA-6B6C51A1B1CC}"/>
+                </a:ext>
+              </a:extLst>
+            </p:cNvPr>
+            <p:cNvPicPr>
+              <a:picLocks noChangeAspect="1"/>
+            </p:cNvPicPr>
+            <p:nvPr/>
+          </p:nvPicPr>
+          <p:blipFill>
+            <a:blip r:embed="rId4">
+              <a:extLst>
+                <a:ext uri="{BEBA8EAE-BF5A-486C-A8C5-ECC9F3942E4B}">
+                  <a14:imgProps xmlns:a14="http://schemas.microsoft.com/office/drawing/2010/main">
+                    <a14:imgLayer r:embed="rId5">
+                      <a14:imgEffect>
+                        <a14:sharpenSoften amount="50000"/>
+                      </a14:imgEffect>
+                      <a14:imgEffect>
+                        <a14:saturation sat="400000"/>
+                      </a14:imgEffect>
+                    </a14:imgLayer>
+                  </a14:imgProps>
+                </a:ext>
+                <a:ext uri="{28A0092B-C50C-407E-A947-70E740481C1C}">
+                  <a14:useLocalDpi xmlns:a14="http://schemas.microsoft.com/office/drawing/2010/main" val="0"/>
+                </a:ext>
+                <a:ext uri="{837473B0-CC2E-450A-ABE3-18F120FF3D39}">
+                  <a1611:picAttrSrcUrl xmlns:a1611="http://schemas.microsoft.com/office/drawing/2016/11/main" r:id="rId6"/>
+                </a:ext>
+              </a:extLst>
+            </a:blip>
+            <a:stretch>
+              <a:fillRect/>
+            </a:stretch>
+          </p:blipFill>
+          <p:spPr>
+            <a:xfrm>
+              <a:off x="2906733" y="3193200"/>
+              <a:ext cx="420229" cy="280700"/>
+            </a:xfrm>
+            <a:prstGeom prst="rect">
+              <a:avLst/>
+            </a:prstGeom>
+          </p:spPr>
+        </p:pic>
+      </p:grpSp>
+      <p:sp>
+        <p:nvSpPr>
+          <p:cNvPr id="12" name="TextBox 11">
+            <a:extLst>
+              <a:ext uri="{FF2B5EF4-FFF2-40B4-BE49-F238E27FC236}">
+                <a16:creationId xmlns:a16="http://schemas.microsoft.com/office/drawing/2014/main" id="{BC7F22A3-D4C3-18CA-C25B-26E16A9CD8F9}"/>
+              </a:ext>
+            </a:extLst>
+          </p:cNvPr>
+          <p:cNvSpPr txBox="1"/>
+          <p:nvPr/>
+        </p:nvSpPr>
+        <p:spPr>
+          <a:xfrm>
+            <a:off x="6338210" y="2690335"/>
+            <a:ext cx="3350539" cy="1477328"/>
+          </a:xfrm>
+          <a:prstGeom prst="rect">
+            <a:avLst/>
+          </a:prstGeom>
+          <a:noFill/>
+        </p:spPr>
+        <p:txBody>
+          <a:bodyPr wrap="square" rtlCol="0">
+            <a:spAutoFit/>
+          </a:bodyPr>
+          <a:lstStyle/>
+          <a:p>
+            <a:pPr marL="285750" indent="-285750">
+              <a:buFont typeface="Arial" panose="020B0604020202020204" pitchFamily="34" charset="0"/>
+              <a:buChar char="•"/>
+            </a:pPr>
+            <a:r>
+              <a:rPr lang="en-US" b="1" dirty="0" err="1"/>
+              <a:t>Kartu</a:t>
+            </a:r>
+            <a:r>
+              <a:rPr lang="en-US" b="1" dirty="0"/>
+              <a:t> </a:t>
+            </a:r>
+            <a:r>
+              <a:rPr lang="en-US" b="1" dirty="0" err="1"/>
+              <a:t>Fisik</a:t>
+            </a:r>
+            <a:endParaRPr lang="en-US" b="1" dirty="0"/>
+          </a:p>
+          <a:p>
+            <a:pPr marL="285750" indent="-285750">
+              <a:buFont typeface="Arial" panose="020B0604020202020204" pitchFamily="34" charset="0"/>
+              <a:buChar char="•"/>
+            </a:pPr>
+            <a:r>
+              <a:rPr lang="en-US" b="1" dirty="0"/>
+              <a:t>Barcode/ id unique</a:t>
+            </a:r>
+          </a:p>
+          <a:p>
+            <a:pPr marL="285750" indent="-285750">
+              <a:buFont typeface="Arial" panose="020B0604020202020204" pitchFamily="34" charset="0"/>
+              <a:buChar char="•"/>
+            </a:pPr>
+            <a:r>
+              <a:rPr lang="en-US" b="1" dirty="0"/>
+              <a:t>Integrasi </a:t>
+            </a:r>
+            <a:r>
+              <a:rPr lang="en-US" b="1" dirty="0" err="1"/>
+              <a:t>dengan</a:t>
+            </a:r>
+            <a:r>
+              <a:rPr lang="en-US" b="1" dirty="0"/>
+              <a:t> </a:t>
+            </a:r>
+            <a:r>
+              <a:rPr lang="en-US" b="1" dirty="0" err="1"/>
+              <a:t>aplikasi</a:t>
+            </a:r>
+            <a:r>
+              <a:rPr lang="en-US" b="1" dirty="0"/>
+              <a:t> POS</a:t>
+            </a:r>
+          </a:p>
+          <a:p>
+            <a:pPr marL="285750" indent="-285750">
+              <a:buFont typeface="Arial" panose="020B0604020202020204" pitchFamily="34" charset="0"/>
+              <a:buChar char="•"/>
+            </a:pPr>
+            <a:r>
+              <a:rPr lang="en-US" b="1" dirty="0"/>
+              <a:t>Point </a:t>
+            </a:r>
+            <a:r>
+              <a:rPr lang="en-US" b="1" dirty="0" err="1"/>
+              <a:t>didapat</a:t>
+            </a:r>
+            <a:r>
+              <a:rPr lang="en-US" b="1" dirty="0"/>
+              <a:t> </a:t>
+            </a:r>
+            <a:r>
+              <a:rPr lang="en-US" b="1" dirty="0" err="1"/>
+              <a:t>ketika</a:t>
+            </a:r>
+            <a:r>
+              <a:rPr lang="en-US" b="1" dirty="0"/>
+              <a:t> </a:t>
+            </a:r>
+            <a:r>
+              <a:rPr lang="en-US" b="1" dirty="0" err="1"/>
+              <a:t>mencapai</a:t>
+            </a:r>
+            <a:r>
+              <a:rPr lang="en-US" b="1" dirty="0"/>
+              <a:t> nominal </a:t>
+            </a:r>
+            <a:r>
+              <a:rPr lang="en-US" b="1" dirty="0" err="1"/>
+              <a:t>tertentu</a:t>
+            </a:r>
+            <a:endParaRPr lang="en-US" b="1" dirty="0"/>
+          </a:p>
+        </p:txBody>
+      </p:sp>
+    </p:spTree>
+    <p:extLst>
+      <p:ext uri="{BB962C8B-B14F-4D97-AF65-F5344CB8AC3E}">
+        <p14:creationId xmlns:p14="http://schemas.microsoft.com/office/powerpoint/2010/main" val="2510162196"/>
+      </p:ext>
+    </p:extLst>
+  </p:cSld>
+  <p:clrMapOvr>
+    <a:masterClrMapping/>
+  </p:clrMapOvr>
+  <mc:AlternateContent xmlns:mc="http://schemas.openxmlformats.org/markup-compatibility/2006" xmlns:p159="http://schemas.microsoft.com/office/powerpoint/2015/09/main">
+    <mc:Choice Requires="p159">
+      <p:transition xmlns:p14="http://schemas.microsoft.com/office/powerpoint/2010/main" spd="slow" p14:dur="2000">
+        <p159:morph option="byObject"/>
+      </p:transition>
+    </mc:Choice>
+    <mc:Fallback xmlns="">
+      <p:transition spd="slow">
+        <p:fade/>
+      </p:transition>
+    </mc:Fallback>
+  </mc:AlternateContent>
+</p:sld>
+</file>
+
+<file path=ppt/slides/slide13.xml><?xml version="1.0" encoding="utf-8"?>
+<p:sld xmlns:a="http://schemas.openxmlformats.org/drawingml/2006/main" xmlns:r="http://schemas.openxmlformats.org/officeDocument/2006/relationships" xmlns:p="http://schemas.openxmlformats.org/presentationml/2006/main">
+  <p:cSld>
+    <p:spTree>
+      <p:nvGrpSpPr>
+        <p:cNvPr id="1" name=""/>
+        <p:cNvGrpSpPr/>
+        <p:nvPr/>
+      </p:nvGrpSpPr>
+      <p:grpSpPr>
+        <a:xfrm>
+          <a:off x="0" y="0"/>
+          <a:ext cx="0" cy="0"/>
+          <a:chOff x="0" y="0"/>
+          <a:chExt cx="0" cy="0"/>
+        </a:xfrm>
+      </p:grpSpPr>
+      <p:pic>
+        <p:nvPicPr>
+          <p:cNvPr id="9" name="Picture 8">
+            <a:extLst>
+              <a:ext uri="{FF2B5EF4-FFF2-40B4-BE49-F238E27FC236}">
+                <a16:creationId xmlns:a16="http://schemas.microsoft.com/office/drawing/2014/main" id="{477EA02D-311C-AEF8-E204-F404BFEF283B}"/>
+              </a:ext>
+            </a:extLst>
+          </p:cNvPr>
+          <p:cNvPicPr>
+            <a:picLocks noChangeAspect="1"/>
+          </p:cNvPicPr>
+          <p:nvPr/>
+        </p:nvPicPr>
+        <p:blipFill>
+          <a:blip r:embed="rId2">
+            <a:lum bright="70000" contrast="-70000"/>
+            <a:extLst>
+              <a:ext uri="{28A0092B-C50C-407E-A947-70E740481C1C}">
+                <a14:useLocalDpi xmlns:a14="http://schemas.microsoft.com/office/drawing/2010/main" val="0"/>
+              </a:ext>
+              <a:ext uri="{837473B0-CC2E-450A-ABE3-18F120FF3D39}">
+                <a1611:picAttrSrcUrl xmlns:a1611="http://schemas.microsoft.com/office/drawing/2016/11/main" r:id="rId3"/>
+              </a:ext>
+            </a:extLst>
+          </a:blip>
+          <a:stretch>
+            <a:fillRect/>
+          </a:stretch>
+        </p:blipFill>
+        <p:spPr>
+          <a:xfrm>
+            <a:off x="3707744" y="989668"/>
+            <a:ext cx="5260932" cy="4572000"/>
+          </a:xfrm>
+          <a:prstGeom prst="rect">
+            <a:avLst/>
+          </a:prstGeom>
+        </p:spPr>
+      </p:pic>
+      <p:pic>
+        <p:nvPicPr>
+          <p:cNvPr id="5" name="Picture 4">
+            <a:extLst>
+              <a:ext uri="{FF2B5EF4-FFF2-40B4-BE49-F238E27FC236}">
+                <a16:creationId xmlns:a16="http://schemas.microsoft.com/office/drawing/2014/main" id="{1CE035F3-616F-6528-75E5-E5DFD28DAA8D}"/>
+              </a:ext>
+            </a:extLst>
+          </p:cNvPr>
+          <p:cNvPicPr>
+            <a:picLocks noChangeAspect="1"/>
+          </p:cNvPicPr>
+          <p:nvPr/>
+        </p:nvPicPr>
+        <p:blipFill>
+          <a:blip r:embed="rId4">
+            <a:extLst>
+              <a:ext uri="{BEBA8EAE-BF5A-486C-A8C5-ECC9F3942E4B}">
+                <a14:imgProps xmlns:a14="http://schemas.microsoft.com/office/drawing/2010/main">
+                  <a14:imgLayer r:embed="rId5">
+                    <a14:imgEffect>
+                      <a14:sharpenSoften amount="50000"/>
+                    </a14:imgEffect>
+                    <a14:imgEffect>
+                      <a14:saturation sat="400000"/>
+                    </a14:imgEffect>
+                  </a14:imgLayer>
+                </a14:imgProps>
+              </a:ext>
+              <a:ext uri="{28A0092B-C50C-407E-A947-70E740481C1C}">
+                <a14:useLocalDpi xmlns:a14="http://schemas.microsoft.com/office/drawing/2010/main" val="0"/>
+              </a:ext>
+              <a:ext uri="{837473B0-CC2E-450A-ABE3-18F120FF3D39}">
+                <a1611:picAttrSrcUrl xmlns:a1611="http://schemas.microsoft.com/office/drawing/2016/11/main" r:id="rId6"/>
+              </a:ext>
+            </a:extLst>
+          </a:blip>
+          <a:stretch>
+            <a:fillRect/>
+          </a:stretch>
+        </p:blipFill>
+        <p:spPr>
+          <a:xfrm>
+            <a:off x="387683" y="228600"/>
+            <a:ext cx="1368926" cy="914400"/>
+          </a:xfrm>
+          <a:prstGeom prst="rect">
+            <a:avLst/>
+          </a:prstGeom>
+        </p:spPr>
+      </p:pic>
+      <p:sp>
+        <p:nvSpPr>
+          <p:cNvPr id="8" name="TextBox 7">
+            <a:extLst>
+              <a:ext uri="{FF2B5EF4-FFF2-40B4-BE49-F238E27FC236}">
+                <a16:creationId xmlns:a16="http://schemas.microsoft.com/office/drawing/2014/main" id="{307471AE-41B6-710A-8B15-AC379FFDE746}"/>
+              </a:ext>
+            </a:extLst>
+          </p:cNvPr>
+          <p:cNvSpPr txBox="1"/>
+          <p:nvPr/>
+        </p:nvSpPr>
+        <p:spPr>
+          <a:xfrm>
+            <a:off x="3896191" y="331857"/>
+            <a:ext cx="4399618" cy="1323439"/>
+          </a:xfrm>
+          <a:prstGeom prst="rect">
+            <a:avLst/>
+          </a:prstGeom>
+          <a:noFill/>
+        </p:spPr>
+        <p:txBody>
+          <a:bodyPr wrap="square" rtlCol="0">
+            <a:spAutoFit/>
+          </a:bodyPr>
+          <a:lstStyle/>
+          <a:p>
+            <a:pPr algn="ctr"/>
+            <a:r>
+              <a:rPr lang="en-US" sz="4000" b="1" dirty="0"/>
+              <a:t>OVERVIEW SISTEM MEMBER CARD</a:t>
+            </a:r>
+            <a:endParaRPr lang="en-ID" sz="4000" b="1" dirty="0"/>
+          </a:p>
+        </p:txBody>
+      </p:sp>
+      <p:sp>
+        <p:nvSpPr>
+          <p:cNvPr id="12" name="TextBox 11">
+            <a:extLst>
+              <a:ext uri="{FF2B5EF4-FFF2-40B4-BE49-F238E27FC236}">
+                <a16:creationId xmlns:a16="http://schemas.microsoft.com/office/drawing/2014/main" id="{BC7F22A3-D4C3-18CA-C25B-26E16A9CD8F9}"/>
+              </a:ext>
+            </a:extLst>
+          </p:cNvPr>
+          <p:cNvSpPr txBox="1"/>
+          <p:nvPr/>
+        </p:nvSpPr>
+        <p:spPr>
+          <a:xfrm>
+            <a:off x="6338210" y="2967334"/>
+            <a:ext cx="3350539" cy="1754326"/>
+          </a:xfrm>
+          <a:prstGeom prst="rect">
+            <a:avLst/>
+          </a:prstGeom>
+          <a:noFill/>
+        </p:spPr>
+        <p:txBody>
+          <a:bodyPr wrap="square" rtlCol="0">
+            <a:spAutoFit/>
+          </a:bodyPr>
+          <a:lstStyle/>
+          <a:p>
+            <a:pPr marL="285750" indent="-285750">
+              <a:buFont typeface="Arial" panose="020B0604020202020204" pitchFamily="34" charset="0"/>
+              <a:buChar char="•"/>
+            </a:pPr>
+            <a:r>
+              <a:rPr lang="en-US" b="1" dirty="0" err="1"/>
+              <a:t>Menangani</a:t>
+            </a:r>
+            <a:r>
+              <a:rPr lang="en-US" b="1" dirty="0"/>
+              <a:t> </a:t>
+            </a:r>
+            <a:r>
+              <a:rPr lang="en-US" b="1" dirty="0" err="1"/>
+              <a:t>olah</a:t>
+            </a:r>
+            <a:r>
+              <a:rPr lang="en-US" b="1" dirty="0"/>
+              <a:t> data </a:t>
+            </a:r>
+            <a:r>
+              <a:rPr lang="en-US" b="1" dirty="0" err="1"/>
+              <a:t>barang</a:t>
+            </a:r>
+            <a:endParaRPr lang="en-US" b="1" dirty="0"/>
+          </a:p>
+          <a:p>
+            <a:pPr marL="285750" indent="-285750">
+              <a:buFont typeface="Arial" panose="020B0604020202020204" pitchFamily="34" charset="0"/>
+              <a:buChar char="•"/>
+            </a:pPr>
+            <a:r>
+              <a:rPr lang="en-US" b="1" dirty="0" err="1"/>
+              <a:t>Pembuatan</a:t>
+            </a:r>
+            <a:r>
+              <a:rPr lang="en-US" b="1" dirty="0"/>
+              <a:t> promo/flash sale</a:t>
+            </a:r>
+          </a:p>
+          <a:p>
+            <a:pPr marL="285750" indent="-285750">
+              <a:buFont typeface="Arial" panose="020B0604020202020204" pitchFamily="34" charset="0"/>
+              <a:buChar char="•"/>
+            </a:pPr>
+            <a:r>
+              <a:rPr lang="en-US" b="1" dirty="0"/>
+              <a:t>Integrasi </a:t>
+            </a:r>
+            <a:r>
+              <a:rPr lang="en-US" b="1" dirty="0" err="1"/>
+              <a:t>dengan</a:t>
+            </a:r>
+            <a:r>
+              <a:rPr lang="en-US" b="1" dirty="0"/>
+              <a:t> member card</a:t>
+            </a:r>
+          </a:p>
+          <a:p>
+            <a:pPr marL="285750" indent="-285750">
+              <a:buFont typeface="Arial" panose="020B0604020202020204" pitchFamily="34" charset="0"/>
+              <a:buChar char="•"/>
+            </a:pPr>
+            <a:r>
+              <a:rPr lang="en-US" b="1" dirty="0"/>
+              <a:t>Fitur </a:t>
+            </a:r>
+            <a:r>
+              <a:rPr lang="en-US" b="1" dirty="0" err="1"/>
+              <a:t>standar</a:t>
+            </a:r>
+            <a:r>
+              <a:rPr lang="en-US" b="1" dirty="0"/>
+              <a:t> </a:t>
+            </a:r>
+            <a:r>
+              <a:rPr lang="en-US" b="1" dirty="0" err="1"/>
+              <a:t>aplikasi</a:t>
+            </a:r>
+            <a:r>
+              <a:rPr lang="en-US" b="1" dirty="0"/>
+              <a:t> POS</a:t>
+            </a:r>
+          </a:p>
+          <a:p>
+            <a:pPr marL="285750" indent="-285750">
+              <a:buFont typeface="Arial" panose="020B0604020202020204" pitchFamily="34" charset="0"/>
+              <a:buChar char="•"/>
+            </a:pPr>
+            <a:endParaRPr lang="en-US" b="1" dirty="0"/>
+          </a:p>
+          <a:p>
+            <a:pPr marL="285750" indent="-285750">
+              <a:buFont typeface="Arial" panose="020B0604020202020204" pitchFamily="34" charset="0"/>
+              <a:buChar char="•"/>
+            </a:pPr>
+            <a:endParaRPr lang="en-US" b="1" dirty="0"/>
+          </a:p>
+        </p:txBody>
+      </p:sp>
+      <p:pic>
+        <p:nvPicPr>
+          <p:cNvPr id="11" name="Picture 10">
+            <a:extLst>
+              <a:ext uri="{FF2B5EF4-FFF2-40B4-BE49-F238E27FC236}">
+                <a16:creationId xmlns:a16="http://schemas.microsoft.com/office/drawing/2014/main" id="{09E6F419-687A-C111-45AB-9659BBA6749B}"/>
+              </a:ext>
+            </a:extLst>
+          </p:cNvPr>
+          <p:cNvPicPr>
+            <a:picLocks noChangeAspect="1"/>
+          </p:cNvPicPr>
+          <p:nvPr/>
+        </p:nvPicPr>
+        <p:blipFill>
+          <a:blip r:embed="rId7">
+            <a:lum bright="70000" contrast="-70000"/>
+            <a:extLst>
+              <a:ext uri="{28A0092B-C50C-407E-A947-70E740481C1C}">
+                <a14:useLocalDpi xmlns:a14="http://schemas.microsoft.com/office/drawing/2010/main" val="0"/>
+              </a:ext>
+            </a:extLst>
+          </a:blip>
+          <a:stretch>
+            <a:fillRect/>
+          </a:stretch>
+        </p:blipFill>
+        <p:spPr>
+          <a:xfrm>
+            <a:off x="3789228" y="2455096"/>
+            <a:ext cx="2306772" cy="2306772"/>
+          </a:xfrm>
+          <a:prstGeom prst="rect">
+            <a:avLst/>
+          </a:prstGeom>
+        </p:spPr>
+      </p:pic>
+      <p:sp>
+        <p:nvSpPr>
+          <p:cNvPr id="13" name="TextBox 12">
+            <a:extLst>
+              <a:ext uri="{FF2B5EF4-FFF2-40B4-BE49-F238E27FC236}">
+                <a16:creationId xmlns:a16="http://schemas.microsoft.com/office/drawing/2014/main" id="{007ED47B-FDCE-0A47-4557-618236C5BEDC}"/>
+              </a:ext>
+            </a:extLst>
+          </p:cNvPr>
+          <p:cNvSpPr txBox="1"/>
+          <p:nvPr/>
+        </p:nvSpPr>
+        <p:spPr>
+          <a:xfrm>
+            <a:off x="4165532" y="3239150"/>
+            <a:ext cx="1554164" cy="369332"/>
+          </a:xfrm>
+          <a:prstGeom prst="rect">
+            <a:avLst/>
+          </a:prstGeom>
+          <a:noFill/>
+        </p:spPr>
+        <p:txBody>
+          <a:bodyPr wrap="square" rtlCol="0">
+            <a:spAutoFit/>
+          </a:bodyPr>
+          <a:lstStyle/>
+          <a:p>
+            <a:pPr algn="ctr"/>
+            <a:r>
+              <a:rPr lang="en-US" b="1" dirty="0" err="1"/>
+              <a:t>Aplikasi</a:t>
+            </a:r>
+            <a:r>
+              <a:rPr lang="en-US" b="1" dirty="0"/>
+              <a:t> POS</a:t>
+            </a:r>
+          </a:p>
+        </p:txBody>
+      </p:sp>
+    </p:spTree>
+    <p:extLst>
+      <p:ext uri="{BB962C8B-B14F-4D97-AF65-F5344CB8AC3E}">
+        <p14:creationId xmlns:p14="http://schemas.microsoft.com/office/powerpoint/2010/main" val="423528111"/>
+      </p:ext>
+    </p:extLst>
+  </p:cSld>
+  <p:clrMapOvr>
+    <a:masterClrMapping/>
+  </p:clrMapOvr>
+  <mc:AlternateContent xmlns:mc="http://schemas.openxmlformats.org/markup-compatibility/2006" xmlns:p159="http://schemas.microsoft.com/office/powerpoint/2015/09/main">
+    <mc:Choice Requires="p159">
+      <p:transition xmlns:p14="http://schemas.microsoft.com/office/powerpoint/2010/main" spd="slow" p14:dur="2000">
+        <p159:morph option="byObject"/>
+      </p:transition>
+    </mc:Choice>
+    <mc:Fallback xmlns="">
+      <p:transition spd="slow">
+        <p:fade/>
+      </p:transition>
+    </mc:Fallback>
+  </mc:AlternateContent>
+</p:sld>
+</file>
+
+<file path=ppt/slides/slide14.xml><?xml version="1.0" encoding="utf-8"?>
+<p:sld xmlns:a="http://schemas.openxmlformats.org/drawingml/2006/main" xmlns:r="http://schemas.openxmlformats.org/officeDocument/2006/relationships" xmlns:p="http://schemas.openxmlformats.org/presentationml/2006/main">
+  <p:cSld>
+    <p:spTree>
+      <p:nvGrpSpPr>
+        <p:cNvPr id="1" name=""/>
+        <p:cNvGrpSpPr/>
+        <p:nvPr/>
+      </p:nvGrpSpPr>
+      <p:grpSpPr>
+        <a:xfrm>
+          <a:off x="0" y="0"/>
+          <a:ext cx="0" cy="0"/>
+          <a:chOff x="0" y="0"/>
+          <a:chExt cx="0" cy="0"/>
+        </a:xfrm>
+      </p:grpSpPr>
+      <p:pic>
+        <p:nvPicPr>
+          <p:cNvPr id="9" name="Picture 8">
+            <a:extLst>
+              <a:ext uri="{FF2B5EF4-FFF2-40B4-BE49-F238E27FC236}">
+                <a16:creationId xmlns:a16="http://schemas.microsoft.com/office/drawing/2014/main" id="{477EA02D-311C-AEF8-E204-F404BFEF283B}"/>
+              </a:ext>
+            </a:extLst>
+          </p:cNvPr>
+          <p:cNvPicPr>
+            <a:picLocks noChangeAspect="1"/>
+          </p:cNvPicPr>
+          <p:nvPr/>
+        </p:nvPicPr>
+        <p:blipFill>
+          <a:blip r:embed="rId2">
+            <a:lum bright="70000" contrast="-70000"/>
+            <a:extLst>
+              <a:ext uri="{28A0092B-C50C-407E-A947-70E740481C1C}">
+                <a14:useLocalDpi xmlns:a14="http://schemas.microsoft.com/office/drawing/2010/main" val="0"/>
+              </a:ext>
+              <a:ext uri="{837473B0-CC2E-450A-ABE3-18F120FF3D39}">
+                <a1611:picAttrSrcUrl xmlns:a1611="http://schemas.microsoft.com/office/drawing/2016/11/main" r:id="rId3"/>
+              </a:ext>
+            </a:extLst>
+          </a:blip>
+          <a:stretch>
+            <a:fillRect/>
+          </a:stretch>
+        </p:blipFill>
+        <p:spPr>
+          <a:xfrm>
+            <a:off x="3707744" y="989668"/>
+            <a:ext cx="5260932" cy="4572000"/>
+          </a:xfrm>
+          <a:prstGeom prst="rect">
+            <a:avLst/>
+          </a:prstGeom>
+        </p:spPr>
+      </p:pic>
+      <p:pic>
+        <p:nvPicPr>
+          <p:cNvPr id="5" name="Picture 4">
+            <a:extLst>
+              <a:ext uri="{FF2B5EF4-FFF2-40B4-BE49-F238E27FC236}">
+                <a16:creationId xmlns:a16="http://schemas.microsoft.com/office/drawing/2014/main" id="{1CE035F3-616F-6528-75E5-E5DFD28DAA8D}"/>
+              </a:ext>
+            </a:extLst>
+          </p:cNvPr>
+          <p:cNvPicPr>
+            <a:picLocks noChangeAspect="1"/>
+          </p:cNvPicPr>
+          <p:nvPr/>
+        </p:nvPicPr>
+        <p:blipFill>
+          <a:blip r:embed="rId4">
+            <a:extLst>
+              <a:ext uri="{BEBA8EAE-BF5A-486C-A8C5-ECC9F3942E4B}">
+                <a14:imgProps xmlns:a14="http://schemas.microsoft.com/office/drawing/2010/main">
+                  <a14:imgLayer r:embed="rId5">
+                    <a14:imgEffect>
+                      <a14:sharpenSoften amount="50000"/>
+                    </a14:imgEffect>
+                    <a14:imgEffect>
+                      <a14:saturation sat="400000"/>
+                    </a14:imgEffect>
+                  </a14:imgLayer>
+                </a14:imgProps>
+              </a:ext>
+              <a:ext uri="{28A0092B-C50C-407E-A947-70E740481C1C}">
+                <a14:useLocalDpi xmlns:a14="http://schemas.microsoft.com/office/drawing/2010/main" val="0"/>
+              </a:ext>
+              <a:ext uri="{837473B0-CC2E-450A-ABE3-18F120FF3D39}">
+                <a1611:picAttrSrcUrl xmlns:a1611="http://schemas.microsoft.com/office/drawing/2016/11/main" r:id="rId6"/>
+              </a:ext>
+            </a:extLst>
+          </a:blip>
+          <a:stretch>
+            <a:fillRect/>
+          </a:stretch>
+        </p:blipFill>
+        <p:spPr>
+          <a:xfrm>
+            <a:off x="387683" y="228600"/>
+            <a:ext cx="1368926" cy="914400"/>
+          </a:xfrm>
+          <a:prstGeom prst="rect">
+            <a:avLst/>
+          </a:prstGeom>
+        </p:spPr>
+      </p:pic>
+      <p:sp>
+        <p:nvSpPr>
+          <p:cNvPr id="8" name="TextBox 7">
+            <a:extLst>
+              <a:ext uri="{FF2B5EF4-FFF2-40B4-BE49-F238E27FC236}">
+                <a16:creationId xmlns:a16="http://schemas.microsoft.com/office/drawing/2014/main" id="{307471AE-41B6-710A-8B15-AC379FFDE746}"/>
+              </a:ext>
+            </a:extLst>
+          </p:cNvPr>
+          <p:cNvSpPr txBox="1"/>
+          <p:nvPr/>
+        </p:nvSpPr>
+        <p:spPr>
+          <a:xfrm>
+            <a:off x="3896191" y="331857"/>
+            <a:ext cx="4399618" cy="707886"/>
+          </a:xfrm>
+          <a:prstGeom prst="rect">
+            <a:avLst/>
+          </a:prstGeom>
+          <a:noFill/>
+        </p:spPr>
+        <p:txBody>
+          <a:bodyPr wrap="square" rtlCol="0">
+            <a:spAutoFit/>
+          </a:bodyPr>
+          <a:lstStyle/>
+          <a:p>
+            <a:pPr algn="ctr"/>
+            <a:r>
+              <a:rPr lang="en-US" sz="4000" b="1" dirty="0"/>
+              <a:t>ESTIMASI BIAYA</a:t>
+            </a:r>
+            <a:endParaRPr lang="en-ID" sz="4000" b="1" dirty="0"/>
+          </a:p>
+        </p:txBody>
+      </p:sp>
+      <p:graphicFrame>
+        <p:nvGraphicFramePr>
+          <p:cNvPr id="2" name="Table 2">
+            <a:extLst>
+              <a:ext uri="{FF2B5EF4-FFF2-40B4-BE49-F238E27FC236}">
+                <a16:creationId xmlns:a16="http://schemas.microsoft.com/office/drawing/2014/main" id="{98583477-3F90-A319-BDFB-AED75737E9E6}"/>
+              </a:ext>
+            </a:extLst>
+          </p:cNvPr>
+          <p:cNvGraphicFramePr>
+            <a:graphicFrameLocks noGrp="1"/>
+          </p:cNvGraphicFramePr>
+          <p:nvPr>
+            <p:extLst>
+              <p:ext uri="{D42A27DB-BD31-4B8C-83A1-F6EECF244321}">
+                <p14:modId xmlns:p14="http://schemas.microsoft.com/office/powerpoint/2010/main" val="824344782"/>
+              </p:ext>
+            </p:extLst>
+          </p:nvPr>
+        </p:nvGraphicFramePr>
+        <p:xfrm>
+          <a:off x="1868791" y="2651760"/>
+          <a:ext cx="8454418" cy="1554480"/>
+        </p:xfrm>
+        <a:graphic>
+          <a:graphicData uri="http://schemas.openxmlformats.org/drawingml/2006/table">
+            <a:tbl>
+              <a:tblPr firstRow="1" bandRow="1">
+                <a:tableStyleId>{5C22544A-7EE6-4342-B048-85BDC9FD1C3A}</a:tableStyleId>
+              </a:tblPr>
+              <a:tblGrid>
+                <a:gridCol w="4227209">
+                  <a:extLst>
+                    <a:ext uri="{9D8B030D-6E8A-4147-A177-3AD203B41FA5}">
+                      <a16:colId xmlns:a16="http://schemas.microsoft.com/office/drawing/2014/main" val="2670919344"/>
+                    </a:ext>
+                  </a:extLst>
+                </a:gridCol>
+                <a:gridCol w="4227209">
+                  <a:extLst>
+                    <a:ext uri="{9D8B030D-6E8A-4147-A177-3AD203B41FA5}">
+                      <a16:colId xmlns:a16="http://schemas.microsoft.com/office/drawing/2014/main" val="3093142682"/>
+                    </a:ext>
+                  </a:extLst>
+                </a:gridCol>
+              </a:tblGrid>
+              <a:tr h="777240">
+                <a:tc>
+                  <a:txBody>
+                    <a:bodyPr/>
+                    <a:lstStyle/>
+                    <a:p>
+                      <a:pPr algn="ctr"/>
+                      <a:r>
+                        <a:rPr lang="en-US" dirty="0">
+                          <a:solidFill>
+                            <a:schemeClr val="tx1"/>
+                          </a:solidFill>
+                        </a:rPr>
+                        <a:t>Harga</a:t>
+                      </a:r>
+                      <a:endParaRPr lang="en-ID" dirty="0">
+                        <a:solidFill>
+                          <a:schemeClr val="tx1"/>
+                        </a:solidFill>
+                      </a:endParaRPr>
+                    </a:p>
+                  </a:txBody>
+                  <a:tcPr anchor="ctr">
+                    <a:lnL w="12700" cmpd="sng">
+                      <a:noFill/>
+                    </a:lnL>
+                    <a:lnR w="12700" cap="flat" cmpd="sng" algn="ctr">
+                      <a:solidFill>
+                        <a:schemeClr val="tx1"/>
+                      </a:solidFill>
+                      <a:prstDash val="solid"/>
+                      <a:round/>
+                      <a:headEnd type="none" w="med" len="med"/>
+                      <a:tailEnd type="none" w="med" len="med"/>
+                    </a:lnR>
+                    <a:lnT w="12700" cmpd="sng">
+                      <a:noFill/>
+                    </a:lnT>
+                    <a:lnB w="12700" cap="flat" cmpd="sng" algn="ctr">
+                      <a:solidFill>
+                        <a:schemeClr val="tx1"/>
+                      </a:solidFill>
+                      <a:prstDash val="solid"/>
+                      <a:round/>
+                      <a:headEnd type="none" w="med" len="med"/>
+                      <a:tailEnd type="none" w="med" len="med"/>
+                    </a:lnB>
+                    <a:lnTlToBr w="12700" cmpd="sng">
+                      <a:noFill/>
+                      <a:prstDash val="solid"/>
+                    </a:lnTlToBr>
+                    <a:lnBlToTr w="12700" cmpd="sng">
+                      <a:noFill/>
+                      <a:prstDash val="solid"/>
+                    </a:lnBlToTr>
+                    <a:noFill/>
+                  </a:tcPr>
+                </a:tc>
+                <a:tc>
+                  <a:txBody>
+                    <a:bodyPr/>
+                    <a:lstStyle/>
+                    <a:p>
+                      <a:pPr algn="ctr"/>
+                      <a:r>
+                        <a:rPr lang="en-US" dirty="0">
+                          <a:solidFill>
+                            <a:schemeClr val="tx1"/>
+                          </a:solidFill>
+                        </a:rPr>
+                        <a:t>Waktu</a:t>
+                      </a:r>
+                      <a:endParaRPr lang="en-ID" dirty="0">
+                        <a:solidFill>
+                          <a:schemeClr val="tx1"/>
+                        </a:solidFill>
+                      </a:endParaRPr>
+                    </a:p>
+                  </a:txBody>
+                  <a:tcPr anchor="ctr">
+                    <a:lnL w="12700" cap="flat" cmpd="sng" algn="ctr">
+                      <a:solidFill>
+                        <a:schemeClr val="tx1"/>
+                      </a:solidFill>
+                      <a:prstDash val="solid"/>
+                      <a:round/>
+                      <a:headEnd type="none" w="med" len="med"/>
+                      <a:tailEnd type="none" w="med" len="med"/>
+                    </a:lnL>
+                    <a:lnR w="12700" cmpd="sng">
+                      <a:noFill/>
+                    </a:lnR>
+                    <a:lnT w="12700" cmpd="sng">
+                      <a:noFill/>
+                    </a:lnT>
+                    <a:lnB w="12700" cap="flat" cmpd="sng" algn="ctr">
+                      <a:solidFill>
+                        <a:schemeClr val="tx1"/>
+                      </a:solidFill>
+                      <a:prstDash val="solid"/>
+                      <a:round/>
+                      <a:headEnd type="none" w="med" len="med"/>
+                      <a:tailEnd type="none" w="med" len="med"/>
+                    </a:lnB>
+                    <a:lnTlToBr w="12700" cmpd="sng">
+                      <a:noFill/>
+                      <a:prstDash val="solid"/>
+                    </a:lnTlToBr>
+                    <a:lnBlToTr w="12700" cmpd="sng">
+                      <a:noFill/>
+                      <a:prstDash val="solid"/>
+                    </a:lnBlToTr>
+                    <a:noFill/>
+                  </a:tcPr>
+                </a:tc>
+                <a:extLst>
+                  <a:ext uri="{0D108BD9-81ED-4DB2-BD59-A6C34878D82A}">
+                    <a16:rowId xmlns:a16="http://schemas.microsoft.com/office/drawing/2014/main" val="3104089743"/>
+                  </a:ext>
+                </a:extLst>
+              </a:tr>
+              <a:tr h="777240">
+                <a:tc>
+                  <a:txBody>
+                    <a:bodyPr/>
+                    <a:lstStyle/>
+                    <a:p>
+                      <a:pPr algn="ctr"/>
+                      <a:r>
+                        <a:rPr lang="en-US" dirty="0">
+                          <a:solidFill>
+                            <a:schemeClr val="tx1"/>
+                          </a:solidFill>
+                        </a:rPr>
+                        <a:t>25 – 30 Juta</a:t>
+                      </a:r>
+                      <a:endParaRPr lang="en-ID" dirty="0">
+                        <a:solidFill>
+                          <a:schemeClr val="tx1"/>
+                        </a:solidFill>
+                      </a:endParaRPr>
+                    </a:p>
+                  </a:txBody>
+                  <a:tcPr anchor="ctr">
+                    <a:lnL w="12700" cmpd="sng">
+                      <a:noFill/>
+                    </a:lnL>
+                    <a:lnR w="12700" cap="flat" cmpd="sng" algn="ctr">
+                      <a:solidFill>
+                        <a:schemeClr val="tx1"/>
+                      </a:solidFill>
+                      <a:prstDash val="solid"/>
+                      <a:round/>
+                      <a:headEnd type="none" w="med" len="med"/>
+                      <a:tailEnd type="none" w="med" len="med"/>
+                    </a:lnR>
+                    <a:lnT w="12700" cap="flat" cmpd="sng" algn="ctr">
+                      <a:solidFill>
+                        <a:schemeClr val="tx1"/>
+                      </a:solidFill>
+                      <a:prstDash val="solid"/>
+                      <a:round/>
+                      <a:headEnd type="none" w="med" len="med"/>
+                      <a:tailEnd type="none" w="med" len="med"/>
+                    </a:lnT>
+                    <a:lnB w="12700" cmpd="sng">
+                      <a:noFill/>
+                    </a:lnB>
+                    <a:lnTlToBr w="12700" cmpd="sng">
+                      <a:noFill/>
+                      <a:prstDash val="solid"/>
+                    </a:lnTlToBr>
+                    <a:lnBlToTr w="12700" cmpd="sng">
+                      <a:noFill/>
+                      <a:prstDash val="solid"/>
+                    </a:lnBlToTr>
+                    <a:noFill/>
+                  </a:tcPr>
+                </a:tc>
+                <a:tc>
+                  <a:txBody>
+                    <a:bodyPr/>
+                    <a:lstStyle/>
+                    <a:p>
+                      <a:pPr algn="ctr"/>
+                      <a:r>
+                        <a:rPr lang="en-US" dirty="0">
+                          <a:solidFill>
+                            <a:schemeClr val="tx1"/>
+                          </a:solidFill>
+                        </a:rPr>
+                        <a:t>2 </a:t>
+                      </a:r>
+                      <a:r>
+                        <a:rPr lang="en-US" dirty="0" err="1">
+                          <a:solidFill>
+                            <a:schemeClr val="tx1"/>
+                          </a:solidFill>
+                        </a:rPr>
+                        <a:t>Bulan</a:t>
+                      </a:r>
+                      <a:endParaRPr lang="en-ID" dirty="0">
+                        <a:solidFill>
+                          <a:schemeClr val="tx1"/>
+                        </a:solidFill>
+                      </a:endParaRPr>
+                    </a:p>
+                  </a:txBody>
+                  <a:tcPr anchor="ctr">
+                    <a:lnL w="12700" cap="flat" cmpd="sng" algn="ctr">
+                      <a:solidFill>
+                        <a:schemeClr val="tx1"/>
+                      </a:solidFill>
+                      <a:prstDash val="solid"/>
+                      <a:round/>
+                      <a:headEnd type="none" w="med" len="med"/>
+                      <a:tailEnd type="none" w="med" len="med"/>
+                    </a:lnL>
+                    <a:lnR w="12700" cmpd="sng">
+                      <a:noFill/>
+                    </a:lnR>
+                    <a:lnT w="12700" cap="flat" cmpd="sng" algn="ctr">
+                      <a:solidFill>
+                        <a:schemeClr val="tx1"/>
+                      </a:solidFill>
+                      <a:prstDash val="solid"/>
+                      <a:round/>
+                      <a:headEnd type="none" w="med" len="med"/>
+                      <a:tailEnd type="none" w="med" len="med"/>
+                    </a:lnT>
+                    <a:lnB w="12700" cmpd="sng">
+                      <a:noFill/>
+                    </a:lnB>
+                    <a:lnTlToBr w="12700" cmpd="sng">
+                      <a:noFill/>
+                      <a:prstDash val="solid"/>
+                    </a:lnTlToBr>
+                    <a:lnBlToTr w="12700" cmpd="sng">
+                      <a:noFill/>
+                      <a:prstDash val="solid"/>
+                    </a:lnBlToTr>
+                    <a:noFill/>
+                  </a:tcPr>
+                </a:tc>
+                <a:extLst>
+                  <a:ext uri="{0D108BD9-81ED-4DB2-BD59-A6C34878D82A}">
+                    <a16:rowId xmlns:a16="http://schemas.microsoft.com/office/drawing/2014/main" val="1551317046"/>
+                  </a:ext>
+                </a:extLst>
+              </a:tr>
+            </a:tbl>
+          </a:graphicData>
+        </a:graphic>
+      </p:graphicFrame>
+    </p:spTree>
+    <p:extLst>
+      <p:ext uri="{BB962C8B-B14F-4D97-AF65-F5344CB8AC3E}">
+        <p14:creationId xmlns:p14="http://schemas.microsoft.com/office/powerpoint/2010/main" val="535006352"/>
+      </p:ext>
+    </p:extLst>
+  </p:cSld>
+  <p:clrMapOvr>
+    <a:masterClrMapping/>
+  </p:clrMapOvr>
+  <mc:AlternateContent xmlns:mc="http://schemas.openxmlformats.org/markup-compatibility/2006" xmlns:p159="http://schemas.microsoft.com/office/powerpoint/2015/09/main">
+    <mc:Choice Requires="p159">
+      <p:transition xmlns:p14="http://schemas.microsoft.com/office/powerpoint/2010/main" spd="slow" p14:dur="2000">
+        <p159:morph option="byObject"/>
+      </p:transition>
+    </mc:Choice>
+    <mc:Fallback xmlns="">
+      <p:transition spd="slow">
+        <p:fade/>
+      </p:transition>
+    </mc:Fallback>
+  </mc:AlternateContent>
+</p:sld>
+</file>
+
+<file path=ppt/slides/slide15.xml><?xml version="1.0" encoding="utf-8"?>
 <p:sld xmlns:a="http://schemas.openxmlformats.org/drawingml/2006/main" xmlns:r="http://schemas.openxmlformats.org/officeDocument/2006/relationships" xmlns:p="http://schemas.openxmlformats.org/presentationml/2006/main">
   <p:cSld>
     <p:spTree>

</xml_diff>